<commit_message>
Made ? in help image easier to read
</commit_message>
<xml_diff>
--- a/misc/Website pictures.pptx
+++ b/misc/Website pictures.pptx
@@ -104,6 +104,11 @@
       </a:defRPr>
     </a:lvl9pPr>
   </p:defaultTextStyle>
+  <p:extLst>
+    <p:ext uri="{EFAFB233-063F-42B5-8137-9DF3F51BA10A}">
+      <p15:sldGuideLst xmlns:p15="http://schemas.microsoft.com/office/powerpoint/2012/main"/>
+    </p:ext>
+  </p:extLst>
 </p:presentation>
 </file>
 
@@ -238,7 +243,7 @@
           <a:p>
             <a:fld id="{6A99596C-B51D-4E58-B26D-99E5F2326343}" type="datetimeFigureOut">
               <a:rPr lang="en-US" smtClean="0"/>
-              <a:t>2/24/2016</a:t>
+              <a:t>5/10/2016</a:t>
             </a:fld>
             <a:endParaRPr lang="en-US"/>
           </a:p>
@@ -408,7 +413,7 @@
           <a:p>
             <a:fld id="{6A99596C-B51D-4E58-B26D-99E5F2326343}" type="datetimeFigureOut">
               <a:rPr lang="en-US" smtClean="0"/>
-              <a:t>2/24/2016</a:t>
+              <a:t>5/10/2016</a:t>
             </a:fld>
             <a:endParaRPr lang="en-US"/>
           </a:p>
@@ -588,7 +593,7 @@
           <a:p>
             <a:fld id="{6A99596C-B51D-4E58-B26D-99E5F2326343}" type="datetimeFigureOut">
               <a:rPr lang="en-US" smtClean="0"/>
-              <a:t>2/24/2016</a:t>
+              <a:t>5/10/2016</a:t>
             </a:fld>
             <a:endParaRPr lang="en-US"/>
           </a:p>
@@ -758,7 +763,7 @@
           <a:p>
             <a:fld id="{6A99596C-B51D-4E58-B26D-99E5F2326343}" type="datetimeFigureOut">
               <a:rPr lang="en-US" smtClean="0"/>
-              <a:t>2/24/2016</a:t>
+              <a:t>5/10/2016</a:t>
             </a:fld>
             <a:endParaRPr lang="en-US"/>
           </a:p>
@@ -1004,7 +1009,7 @@
           <a:p>
             <a:fld id="{6A99596C-B51D-4E58-B26D-99E5F2326343}" type="datetimeFigureOut">
               <a:rPr lang="en-US" smtClean="0"/>
-              <a:t>2/24/2016</a:t>
+              <a:t>5/10/2016</a:t>
             </a:fld>
             <a:endParaRPr lang="en-US"/>
           </a:p>
@@ -1236,7 +1241,7 @@
           <a:p>
             <a:fld id="{6A99596C-B51D-4E58-B26D-99E5F2326343}" type="datetimeFigureOut">
               <a:rPr lang="en-US" smtClean="0"/>
-              <a:t>2/24/2016</a:t>
+              <a:t>5/10/2016</a:t>
             </a:fld>
             <a:endParaRPr lang="en-US"/>
           </a:p>
@@ -1603,7 +1608,7 @@
           <a:p>
             <a:fld id="{6A99596C-B51D-4E58-B26D-99E5F2326343}" type="datetimeFigureOut">
               <a:rPr lang="en-US" smtClean="0"/>
-              <a:t>2/24/2016</a:t>
+              <a:t>5/10/2016</a:t>
             </a:fld>
             <a:endParaRPr lang="en-US"/>
           </a:p>
@@ -1721,7 +1726,7 @@
           <a:p>
             <a:fld id="{6A99596C-B51D-4E58-B26D-99E5F2326343}" type="datetimeFigureOut">
               <a:rPr lang="en-US" smtClean="0"/>
-              <a:t>2/24/2016</a:t>
+              <a:t>5/10/2016</a:t>
             </a:fld>
             <a:endParaRPr lang="en-US"/>
           </a:p>
@@ -1816,7 +1821,7 @@
           <a:p>
             <a:fld id="{6A99596C-B51D-4E58-B26D-99E5F2326343}" type="datetimeFigureOut">
               <a:rPr lang="en-US" smtClean="0"/>
-              <a:t>2/24/2016</a:t>
+              <a:t>5/10/2016</a:t>
             </a:fld>
             <a:endParaRPr lang="en-US"/>
           </a:p>
@@ -2093,7 +2098,7 @@
           <a:p>
             <a:fld id="{6A99596C-B51D-4E58-B26D-99E5F2326343}" type="datetimeFigureOut">
               <a:rPr lang="en-US" smtClean="0"/>
-              <a:t>2/24/2016</a:t>
+              <a:t>5/10/2016</a:t>
             </a:fld>
             <a:endParaRPr lang="en-US"/>
           </a:p>
@@ -2346,7 +2351,7 @@
           <a:p>
             <a:fld id="{6A99596C-B51D-4E58-B26D-99E5F2326343}" type="datetimeFigureOut">
               <a:rPr lang="en-US" smtClean="0"/>
-              <a:t>2/24/2016</a:t>
+              <a:t>5/10/2016</a:t>
             </a:fld>
             <a:endParaRPr lang="en-US"/>
           </a:p>
@@ -2559,7 +2564,7 @@
           <a:p>
             <a:fld id="{6A99596C-B51D-4E58-B26D-99E5F2326343}" type="datetimeFigureOut">
               <a:rPr lang="en-US" smtClean="0"/>
-              <a:t>2/24/2016</a:t>
+              <a:t>5/10/2016</a:t>
             </a:fld>
             <a:endParaRPr lang="en-US"/>
           </a:p>
@@ -3074,6 +3079,108 @@
           </a:p>
         </p:txBody>
       </p:sp>
+      <p:sp>
+        <p:nvSpPr>
+          <p:cNvPr id="6" name="Oval 5"/>
+          <p:cNvSpPr/>
+          <p:nvPr/>
+        </p:nvSpPr>
+        <p:spPr>
+          <a:xfrm>
+            <a:off x="2842054" y="1556951"/>
+            <a:ext cx="243274" cy="243274"/>
+          </a:xfrm>
+          <a:prstGeom prst="ellipse">
+            <a:avLst/>
+          </a:prstGeom>
+          <a:gradFill flip="none" rotWithShape="1">
+            <a:gsLst>
+              <a:gs pos="0">
+                <a:schemeClr val="accent4">
+                  <a:lumMod val="0"/>
+                  <a:lumOff val="100000"/>
+                </a:schemeClr>
+              </a:gs>
+              <a:gs pos="35000">
+                <a:schemeClr val="accent4">
+                  <a:lumMod val="0"/>
+                  <a:lumOff val="100000"/>
+                </a:schemeClr>
+              </a:gs>
+              <a:gs pos="100000">
+                <a:schemeClr val="accent4">
+                  <a:lumMod val="100000"/>
+                </a:schemeClr>
+              </a:gs>
+            </a:gsLst>
+            <a:path path="circle">
+              <a:fillToRect l="50000" t="-80000" r="50000" b="180000"/>
+            </a:path>
+            <a:tileRect/>
+          </a:gradFill>
+          <a:ln>
+            <a:noFill/>
+          </a:ln>
+        </p:spPr>
+        <p:style>
+          <a:lnRef idx="2">
+            <a:schemeClr val="accent1">
+              <a:shade val="50000"/>
+            </a:schemeClr>
+          </a:lnRef>
+          <a:fillRef idx="1">
+            <a:schemeClr val="accent1"/>
+          </a:fillRef>
+          <a:effectRef idx="0">
+            <a:schemeClr val="accent1"/>
+          </a:effectRef>
+          <a:fontRef idx="minor">
+            <a:schemeClr val="lt1"/>
+          </a:fontRef>
+        </p:style>
+        <p:txBody>
+          <a:bodyPr rtlCol="0" anchor="ctr"/>
+          <a:lstStyle/>
+          <a:p>
+            <a:pPr algn="ctr"/>
+            <a:r>
+              <a:rPr lang="en-US" sz="1600" dirty="0" smtClean="0">
+                <a:solidFill>
+                  <a:schemeClr val="accent4">
+                    <a:lumMod val="75000"/>
+                  </a:schemeClr>
+                </a:solidFill>
+                <a:effectLst>
+                  <a:glow rad="63500">
+                    <a:schemeClr val="accent4">
+                      <a:satMod val="175000"/>
+                      <a:alpha val="40000"/>
+                    </a:schemeClr>
+                  </a:glow>
+                </a:effectLst>
+                <a:latin typeface="Rockwell Extra Bold" panose="02060903040505020403" pitchFamily="18" charset="0"/>
+              </a:rPr>
+              <a:t>?</a:t>
+            </a:r>
+            <a:endParaRPr lang="en-US" sz="1600" dirty="0">
+              <a:solidFill>
+                <a:schemeClr val="accent4">
+                  <a:lumMod val="75000"/>
+                </a:schemeClr>
+              </a:solidFill>
+              <a:effectLst>
+                <a:glow rad="63500">
+                  <a:schemeClr val="accent4">
+                    <a:satMod val="175000"/>
+                    <a:alpha val="40000"/>
+                  </a:schemeClr>
+                </a:glow>
+              </a:effectLst>
+              <a:latin typeface="Rockwell Extra Bold" panose="02060903040505020403" pitchFamily="18" charset="0"/>
+            </a:endParaRPr>
+          </a:p>
+        </p:txBody>
+      </p:sp>
     </p:spTree>
     <p:extLst>
       <p:ext uri="{BB962C8B-B14F-4D97-AF65-F5344CB8AC3E}">

</xml_diff>